<commit_message>
Third year first semester
</commit_message>
<xml_diff>
--- a/3.1 Third Year first semester/ICT-3103 Computer Networks/Lectures/Lecture5.pptx
+++ b/3.1 Third Year first semester/ICT-3103 Computer Networks/Lectures/Lecture5.pptx
@@ -5,7 +5,7 @@
     <p:sldMasterId id="2147483648" r:id="rId1"/>
   </p:sldMasterIdLst>
   <p:notesMasterIdLst>
-    <p:notesMasterId r:id="rId50"/>
+    <p:notesMasterId r:id="rId49"/>
   </p:notesMasterIdLst>
   <p:sldIdLst>
     <p:sldId id="256" r:id="rId2"/>
@@ -55,7 +55,6 @@
     <p:sldId id="303" r:id="rId46"/>
     <p:sldId id="304" r:id="rId47"/>
     <p:sldId id="305" r:id="rId48"/>
-    <p:sldId id="306" r:id="rId49"/>
   </p:sldIdLst>
   <p:sldSz cx="12192000" cy="6858000"/>
   <p:notesSz cx="6858000" cy="9144000"/>
@@ -244,7 +243,7 @@
           <a:p>
             <a:fld id="{92FFF0C8-FEB6-4AB0-B46C-7CBB1C4BF1F5}" type="datetimeFigureOut">
               <a:rPr lang="en-US" smtClean="0"/>
-              <a:t>11/3/2020</a:t>
+              <a:t>7/20/2022</a:t>
             </a:fld>
             <a:endParaRPr lang="en-US"/>
           </a:p>
@@ -3270,95 +3269,6 @@
 </p:notes>
 </file>
 
-<file path=ppt/notesSlides/notesSlide38.xml><?xml version="1.0" encoding="utf-8"?>
-<p:notes xmlns:a="http://schemas.openxmlformats.org/drawingml/2006/main" xmlns:r="http://schemas.openxmlformats.org/officeDocument/2006/relationships" xmlns:p="http://schemas.openxmlformats.org/presentationml/2006/main">
-  <p:cSld>
-    <p:spTree>
-      <p:nvGrpSpPr>
-        <p:cNvPr id="1" name=""/>
-        <p:cNvGrpSpPr/>
-        <p:nvPr/>
-      </p:nvGrpSpPr>
-      <p:grpSpPr>
-        <a:xfrm>
-          <a:off x="0" y="0"/>
-          <a:ext cx="0" cy="0"/>
-          <a:chOff x="0" y="0"/>
-          <a:chExt cx="0" cy="0"/>
-        </a:xfrm>
-      </p:grpSpPr>
-      <p:sp>
-        <p:nvSpPr>
-          <p:cNvPr id="4" name="Rectangle 11"/>
-          <p:cNvSpPr>
-            <a:spLocks noGrp="1" noChangeArrowheads="1"/>
-          </p:cNvSpPr>
-          <p:nvPr>
-            <p:ph type="sldNum" sz="quarter" idx="5"/>
-          </p:nvPr>
-        </p:nvSpPr>
-        <p:spPr>
-          <a:ln/>
-        </p:spPr>
-        <p:txBody>
-          <a:bodyPr/>
-          <a:lstStyle/>
-          <a:p>
-            <a:fld id="{3E410C56-61BD-4427-AB76-1C83A49C12AE}" type="slidenum">
-              <a:rPr lang="en-US" altLang="en-US"/>
-              <a:pPr/>
-              <a:t>48</a:t>
-            </a:fld>
-            <a:endParaRPr lang="en-US" altLang="en-US"/>
-          </a:p>
-        </p:txBody>
-      </p:sp>
-      <p:sp>
-        <p:nvSpPr>
-          <p:cNvPr id="1175554" name="Rectangle 2"/>
-          <p:cNvSpPr>
-            <a:spLocks noGrp="1" noRot="1" noChangeAspect="1" noChangeArrowheads="1" noTextEdit="1"/>
-          </p:cNvSpPr>
-          <p:nvPr>
-            <p:ph type="sldImg"/>
-          </p:nvPr>
-        </p:nvSpPr>
-        <p:spPr>
-          <a:ln/>
-        </p:spPr>
-      </p:sp>
-      <p:sp>
-        <p:nvSpPr>
-          <p:cNvPr id="1175555" name="Rectangle 3"/>
-          <p:cNvSpPr>
-            <a:spLocks noGrp="1" noChangeArrowheads="1"/>
-          </p:cNvSpPr>
-          <p:nvPr>
-            <p:ph type="body" idx="1"/>
-          </p:nvPr>
-        </p:nvSpPr>
-        <p:spPr/>
-        <p:txBody>
-          <a:bodyPr/>
-          <a:lstStyle/>
-          <a:p>
-            <a:endParaRPr lang="en-US" altLang="en-US"/>
-          </a:p>
-        </p:txBody>
-      </p:sp>
-    </p:spTree>
-    <p:extLst>
-      <p:ext uri="{BB962C8B-B14F-4D97-AF65-F5344CB8AC3E}">
-        <p14:creationId xmlns:p14="http://schemas.microsoft.com/office/powerpoint/2010/main" val="3592921617"/>
-      </p:ext>
-    </p:extLst>
-  </p:cSld>
-  <p:clrMapOvr>
-    <a:masterClrMapping/>
-  </p:clrMapOvr>
-</p:notes>
-</file>
-
 <file path=ppt/notesSlides/notesSlide4.xml><?xml version="1.0" encoding="utf-8"?>
 <p:notes xmlns:a="http://schemas.openxmlformats.org/drawingml/2006/main" xmlns:r="http://schemas.openxmlformats.org/officeDocument/2006/relationships" xmlns:p="http://schemas.openxmlformats.org/presentationml/2006/main">
   <p:cSld>
@@ -4037,7 +3947,7 @@
           <a:p>
             <a:fld id="{A2AA6918-1BB2-46CF-8D25-0121B6FDF3F7}" type="datetimeFigureOut">
               <a:rPr lang="en-US" smtClean="0"/>
-              <a:t>11/3/2020</a:t>
+              <a:t>7/20/2022</a:t>
             </a:fld>
             <a:endParaRPr lang="en-US"/>
           </a:p>
@@ -4205,7 +4115,7 @@
           <a:p>
             <a:fld id="{A2AA6918-1BB2-46CF-8D25-0121B6FDF3F7}" type="datetimeFigureOut">
               <a:rPr lang="en-US" smtClean="0"/>
-              <a:t>11/3/2020</a:t>
+              <a:t>7/20/2022</a:t>
             </a:fld>
             <a:endParaRPr lang="en-US"/>
           </a:p>
@@ -4383,7 +4293,7 @@
           <a:p>
             <a:fld id="{A2AA6918-1BB2-46CF-8D25-0121B6FDF3F7}" type="datetimeFigureOut">
               <a:rPr lang="en-US" smtClean="0"/>
-              <a:t>11/3/2020</a:t>
+              <a:t>7/20/2022</a:t>
             </a:fld>
             <a:endParaRPr lang="en-US"/>
           </a:p>
@@ -4551,7 +4461,7 @@
           <a:p>
             <a:fld id="{A2AA6918-1BB2-46CF-8D25-0121B6FDF3F7}" type="datetimeFigureOut">
               <a:rPr lang="en-US" smtClean="0"/>
-              <a:t>11/3/2020</a:t>
+              <a:t>7/20/2022</a:t>
             </a:fld>
             <a:endParaRPr lang="en-US"/>
           </a:p>
@@ -4796,7 +4706,7 @@
           <a:p>
             <a:fld id="{A2AA6918-1BB2-46CF-8D25-0121B6FDF3F7}" type="datetimeFigureOut">
               <a:rPr lang="en-US" smtClean="0"/>
-              <a:t>11/3/2020</a:t>
+              <a:t>7/20/2022</a:t>
             </a:fld>
             <a:endParaRPr lang="en-US"/>
           </a:p>
@@ -5025,7 +4935,7 @@
           <a:p>
             <a:fld id="{A2AA6918-1BB2-46CF-8D25-0121B6FDF3F7}" type="datetimeFigureOut">
               <a:rPr lang="en-US" smtClean="0"/>
-              <a:t>11/3/2020</a:t>
+              <a:t>7/20/2022</a:t>
             </a:fld>
             <a:endParaRPr lang="en-US"/>
           </a:p>
@@ -5389,7 +5299,7 @@
           <a:p>
             <a:fld id="{A2AA6918-1BB2-46CF-8D25-0121B6FDF3F7}" type="datetimeFigureOut">
               <a:rPr lang="en-US" smtClean="0"/>
-              <a:t>11/3/2020</a:t>
+              <a:t>7/20/2022</a:t>
             </a:fld>
             <a:endParaRPr lang="en-US"/>
           </a:p>
@@ -5506,7 +5416,7 @@
           <a:p>
             <a:fld id="{A2AA6918-1BB2-46CF-8D25-0121B6FDF3F7}" type="datetimeFigureOut">
               <a:rPr lang="en-US" smtClean="0"/>
-              <a:t>11/3/2020</a:t>
+              <a:t>7/20/2022</a:t>
             </a:fld>
             <a:endParaRPr lang="en-US"/>
           </a:p>
@@ -5601,7 +5511,7 @@
           <a:p>
             <a:fld id="{A2AA6918-1BB2-46CF-8D25-0121B6FDF3F7}" type="datetimeFigureOut">
               <a:rPr lang="en-US" smtClean="0"/>
-              <a:t>11/3/2020</a:t>
+              <a:t>7/20/2022</a:t>
             </a:fld>
             <a:endParaRPr lang="en-US"/>
           </a:p>
@@ -5876,7 +5786,7 @@
           <a:p>
             <a:fld id="{A2AA6918-1BB2-46CF-8D25-0121B6FDF3F7}" type="datetimeFigureOut">
               <a:rPr lang="en-US" smtClean="0"/>
-              <a:t>11/3/2020</a:t>
+              <a:t>7/20/2022</a:t>
             </a:fld>
             <a:endParaRPr lang="en-US"/>
           </a:p>
@@ -6128,7 +6038,7 @@
           <a:p>
             <a:fld id="{A2AA6918-1BB2-46CF-8D25-0121B6FDF3F7}" type="datetimeFigureOut">
               <a:rPr lang="en-US" smtClean="0"/>
-              <a:t>11/3/2020</a:t>
+              <a:t>7/20/2022</a:t>
             </a:fld>
             <a:endParaRPr lang="en-US"/>
           </a:p>
@@ -6339,7 +6249,7 @@
           <a:p>
             <a:fld id="{A2AA6918-1BB2-46CF-8D25-0121B6FDF3F7}" type="datetimeFigureOut">
               <a:rPr lang="en-US" smtClean="0"/>
-              <a:t>11/3/2020</a:t>
+              <a:t>7/20/2022</a:t>
             </a:fld>
             <a:endParaRPr lang="en-US"/>
           </a:p>
@@ -7732,7 +7642,7 @@
             </a:r>
             <a:r>
               <a:rPr lang="en-US" altLang="en-US" dirty="0"/>
-              <a:t> used by routing protocols help determine the best path to a destination</a:t>
+              <a:t> used by routing protocols to help determine the best path to a destination</a:t>
             </a:r>
           </a:p>
           <a:p>
@@ -14009,8 +13919,8 @@
         </p:blipFill>
         <p:spPr bwMode="auto">
           <a:xfrm>
-            <a:off x="3092450" y="3381376"/>
-            <a:ext cx="5981700" cy="3114675"/>
+            <a:off x="3092450" y="3760234"/>
+            <a:ext cx="5254108" cy="2735817"/>
           </a:xfrm>
           <a:prstGeom prst="rect">
             <a:avLst/>
@@ -14374,214 +14284,6 @@
     <p:extLst>
       <p:ext uri="{BB962C8B-B14F-4D97-AF65-F5344CB8AC3E}">
         <p14:creationId xmlns:p14="http://schemas.microsoft.com/office/powerpoint/2010/main" val="3687680924"/>
-      </p:ext>
-    </p:extLst>
-  </p:cSld>
-  <p:clrMapOvr>
-    <a:masterClrMapping/>
-  </p:clrMapOvr>
-</p:sld>
-</file>
-
-<file path=ppt/slides/slide48.xml><?xml version="1.0" encoding="utf-8"?>
-<p:sld xmlns:a="http://schemas.openxmlformats.org/drawingml/2006/main" xmlns:r="http://schemas.openxmlformats.org/officeDocument/2006/relationships" xmlns:p="http://schemas.openxmlformats.org/presentationml/2006/main">
-  <p:cSld>
-    <p:spTree>
-      <p:nvGrpSpPr>
-        <p:cNvPr id="1" name=""/>
-        <p:cNvGrpSpPr/>
-        <p:nvPr/>
-      </p:nvGrpSpPr>
-      <p:grpSpPr>
-        <a:xfrm>
-          <a:off x="0" y="0"/>
-          <a:ext cx="0" cy="0"/>
-          <a:chOff x="0" y="0"/>
-          <a:chExt cx="0" cy="0"/>
-        </a:xfrm>
-      </p:grpSpPr>
-      <p:pic>
-        <p:nvPicPr>
-          <p:cNvPr id="1174537" name="Picture 9"/>
-          <p:cNvPicPr>
-            <a:picLocks noChangeAspect="1" noChangeArrowheads="1"/>
-          </p:cNvPicPr>
-          <p:nvPr/>
-        </p:nvPicPr>
-        <p:blipFill>
-          <a:blip r:embed="rId3">
-            <a:extLst>
-              <a:ext uri="{28A0092B-C50C-407E-A947-70E740481C1C}">
-                <a14:useLocalDpi xmlns:a14="http://schemas.microsoft.com/office/drawing/2010/main" val="0"/>
-              </a:ext>
-            </a:extLst>
-          </a:blip>
-          <a:srcRect/>
-          <a:stretch>
-            <a:fillRect/>
-          </a:stretch>
-        </p:blipFill>
-        <p:spPr bwMode="auto">
-          <a:xfrm>
-            <a:off x="3617913" y="1593850"/>
-            <a:ext cx="4926012" cy="2357438"/>
-          </a:xfrm>
-          <a:prstGeom prst="rect">
-            <a:avLst/>
-          </a:prstGeom>
-          <a:noFill/>
-          <a:ln>
-            <a:noFill/>
-          </a:ln>
-          <a:effectLst/>
-          <a:extLst>
-            <a:ext uri="{909E8E84-426E-40DD-AFC4-6F175D3DCCD1}">
-              <a14:hiddenFill xmlns:a14="http://schemas.microsoft.com/office/drawing/2010/main">
-                <a:solidFill>
-                  <a:schemeClr val="accent1"/>
-                </a:solidFill>
-              </a14:hiddenFill>
-            </a:ext>
-            <a:ext uri="{91240B29-F687-4F45-9708-019B960494DF}">
-              <a14:hiddenLine xmlns:a14="http://schemas.microsoft.com/office/drawing/2010/main" w="9525" algn="ctr">
-                <a:solidFill>
-                  <a:schemeClr val="tx2"/>
-                </a:solidFill>
-                <a:miter lim="800000"/>
-                <a:headEnd/>
-                <a:tailEnd/>
-              </a14:hiddenLine>
-            </a:ext>
-            <a:ext uri="{AF507438-7753-43E0-B8FC-AC1667EBCBE1}">
-              <a14:hiddenEffects xmlns:a14="http://schemas.microsoft.com/office/drawing/2010/main">
-                <a:effectLst>
-                  <a:outerShdw dist="17961" dir="2700000" algn="ctr" rotWithShape="0">
-                    <a:schemeClr val="bg2"/>
-                  </a:outerShdw>
-                </a:effectLst>
-              </a14:hiddenEffects>
-            </a:ext>
-          </a:extLst>
-        </p:spPr>
-      </p:pic>
-      <p:sp>
-        <p:nvSpPr>
-          <p:cNvPr id="1174530" name="Rectangle 2"/>
-          <p:cNvSpPr>
-            <a:spLocks noGrp="1" noChangeArrowheads="1"/>
-          </p:cNvSpPr>
-          <p:nvPr>
-            <p:ph type="title"/>
-          </p:nvPr>
-        </p:nvSpPr>
-        <p:spPr/>
-        <p:txBody>
-          <a:bodyPr/>
-          <a:lstStyle/>
-          <a:p>
-            <a:r>
-              <a:rPr lang="en-US" altLang="en-US"/>
-              <a:t>Static Routes and Packet Forwarding</a:t>
-            </a:r>
-            <a:endParaRPr lang="en-US" altLang="en-US" sz="3600"/>
-          </a:p>
-        </p:txBody>
-      </p:sp>
-      <p:sp>
-        <p:nvSpPr>
-          <p:cNvPr id="1174531" name="Rectangle 3"/>
-          <p:cNvSpPr>
-            <a:spLocks noGrp="1" noChangeArrowheads="1"/>
-          </p:cNvSpPr>
-          <p:nvPr>
-            <p:ph type="body" idx="1"/>
-          </p:nvPr>
-        </p:nvSpPr>
-        <p:spPr>
-          <a:xfrm>
-            <a:off x="2179639" y="1392239"/>
-            <a:ext cx="7940675" cy="5076825"/>
-          </a:xfrm>
-        </p:spPr>
-        <p:txBody>
-          <a:bodyPr/>
-          <a:lstStyle/>
-          <a:p>
-            <a:r>
-              <a:rPr lang="en-US" altLang="en-US"/>
-              <a:t>Solving a Missing Route </a:t>
-            </a:r>
-          </a:p>
-        </p:txBody>
-      </p:sp>
-      <p:pic>
-        <p:nvPicPr>
-          <p:cNvPr id="1174536" name="Picture 8"/>
-          <p:cNvPicPr>
-            <a:picLocks noChangeAspect="1" noChangeArrowheads="1"/>
-          </p:cNvPicPr>
-          <p:nvPr/>
-        </p:nvPicPr>
-        <p:blipFill>
-          <a:blip r:embed="rId4">
-            <a:extLst>
-              <a:ext uri="{28A0092B-C50C-407E-A947-70E740481C1C}">
-                <a14:useLocalDpi xmlns:a14="http://schemas.microsoft.com/office/drawing/2010/main" val="0"/>
-              </a:ext>
-            </a:extLst>
-          </a:blip>
-          <a:srcRect/>
-          <a:stretch>
-            <a:fillRect/>
-          </a:stretch>
-        </p:blipFill>
-        <p:spPr bwMode="auto">
-          <a:xfrm>
-            <a:off x="3646489" y="4006850"/>
-            <a:ext cx="4872037" cy="2736850"/>
-          </a:xfrm>
-          <a:prstGeom prst="rect">
-            <a:avLst/>
-          </a:prstGeom>
-          <a:noFill/>
-          <a:ln>
-            <a:noFill/>
-          </a:ln>
-          <a:effectLst/>
-          <a:extLst>
-            <a:ext uri="{909E8E84-426E-40DD-AFC4-6F175D3DCCD1}">
-              <a14:hiddenFill xmlns:a14="http://schemas.microsoft.com/office/drawing/2010/main">
-                <a:solidFill>
-                  <a:schemeClr val="accent1"/>
-                </a:solidFill>
-              </a14:hiddenFill>
-            </a:ext>
-            <a:ext uri="{91240B29-F687-4F45-9708-019B960494DF}">
-              <a14:hiddenLine xmlns:a14="http://schemas.microsoft.com/office/drawing/2010/main" w="9525" algn="ctr">
-                <a:solidFill>
-                  <a:schemeClr val="tx2"/>
-                </a:solidFill>
-                <a:miter lim="800000"/>
-                <a:headEnd/>
-                <a:tailEnd/>
-              </a14:hiddenLine>
-            </a:ext>
-            <a:ext uri="{AF507438-7753-43E0-B8FC-AC1667EBCBE1}">
-              <a14:hiddenEffects xmlns:a14="http://schemas.microsoft.com/office/drawing/2010/main">
-                <a:effectLst>
-                  <a:outerShdw dist="17961" dir="2700000" algn="ctr" rotWithShape="0">
-                    <a:schemeClr val="bg2"/>
-                  </a:outerShdw>
-                </a:effectLst>
-              </a14:hiddenEffects>
-            </a:ext>
-          </a:extLst>
-        </p:spPr>
-      </p:pic>
-    </p:spTree>
-    <p:extLst>
-      <p:ext uri="{BB962C8B-B14F-4D97-AF65-F5344CB8AC3E}">
-        <p14:creationId xmlns:p14="http://schemas.microsoft.com/office/powerpoint/2010/main" val="1474018382"/>
       </p:ext>
     </p:extLst>
   </p:cSld>

</xml_diff>